<commit_message>
preparing final pppt and speech for tomorrow's presentation
</commit_message>
<xml_diff>
--- a/MCS_project_sem_III/11490_MCS_project_sem_IV_.pptx
+++ b/MCS_project_sem_III/11490_MCS_project_sem_IV_.pptx
@@ -225,7 +225,7 @@
           <a:p>
             <a:fld id="{CF08B7F0-5E43-431F-BDE1-32DE1BB23599}" type="datetimeFigureOut">
               <a:rPr lang="en-US" smtClean="0"/>
-              <a:t>6/3/2019</a:t>
+              <a:t>6/6/2019</a:t>
             </a:fld>
             <a:endParaRPr lang="en-US"/>
           </a:p>
@@ -680,7 +680,7 @@
           <a:p>
             <a:fld id="{B8CBF50C-4D57-4689-B1EA-297043265C1B}" type="datetime1">
               <a:rPr lang="en-US" smtClean="0"/>
-              <a:t>6/3/2019</a:t>
+              <a:t>6/6/2019</a:t>
             </a:fld>
             <a:endParaRPr lang="en-US" dirty="0"/>
           </a:p>
@@ -1026,7 +1026,7 @@
           <a:p>
             <a:fld id="{497961FE-2CA9-4B19-959C-17C7F8D1DA5F}" type="datetime1">
               <a:rPr lang="en-US" smtClean="0"/>
-              <a:t>6/3/2019</a:t>
+              <a:t>6/6/2019</a:t>
             </a:fld>
             <a:endParaRPr lang="en-US" dirty="0"/>
           </a:p>
@@ -1435,7 +1435,7 @@
           <a:p>
             <a:fld id="{C44CBEE7-20AB-47A9-89CA-98BC1BBE52A4}" type="datetime1">
               <a:rPr lang="en-US" smtClean="0"/>
-              <a:t>6/3/2019</a:t>
+              <a:t>6/6/2019</a:t>
             </a:fld>
             <a:endParaRPr lang="en-US" dirty="0"/>
           </a:p>
@@ -1778,7 +1778,7 @@
           <a:p>
             <a:fld id="{6C6C6DD6-9D06-4BF0-878A-8B880DEB7DE8}" type="datetime1">
               <a:rPr lang="en-US" smtClean="0"/>
-              <a:t>6/3/2019</a:t>
+              <a:t>6/6/2019</a:t>
             </a:fld>
             <a:endParaRPr lang="en-US" dirty="0"/>
           </a:p>
@@ -2106,7 +2106,7 @@
           <a:p>
             <a:fld id="{2C99D341-E087-443F-BA9B-20814FC5BC96}" type="datetime1">
               <a:rPr lang="en-US" smtClean="0"/>
-              <a:t>6/3/2019</a:t>
+              <a:t>6/6/2019</a:t>
             </a:fld>
             <a:endParaRPr lang="en-US" dirty="0"/>
           </a:p>
@@ -2510,7 +2510,7 @@
           <a:p>
             <a:fld id="{FA48846F-FEB4-4FFA-8699-52E4C5746C02}" type="datetime1">
               <a:rPr lang="en-US" smtClean="0"/>
-              <a:t>6/3/2019</a:t>
+              <a:t>6/6/2019</a:t>
             </a:fld>
             <a:endParaRPr lang="en-US" dirty="0"/>
           </a:p>
@@ -2775,7 +2775,7 @@
           <a:p>
             <a:fld id="{E1222A53-0058-49C7-9F87-C0462F24585B}" type="datetime1">
               <a:rPr lang="en-US" smtClean="0"/>
-              <a:t>6/3/2019</a:t>
+              <a:t>6/6/2019</a:t>
             </a:fld>
             <a:endParaRPr lang="en-US" dirty="0"/>
           </a:p>
@@ -3045,7 +3045,7 @@
           <a:p>
             <a:fld id="{BFFE0869-D36E-42C8-BFEC-D126EA7A0815}" type="datetime1">
               <a:rPr lang="en-US" smtClean="0"/>
-              <a:t>6/3/2019</a:t>
+              <a:t>6/6/2019</a:t>
             </a:fld>
             <a:endParaRPr lang="en-US" dirty="0"/>
           </a:p>
@@ -3315,7 +3315,7 @@
           <a:p>
             <a:fld id="{3C7C9E70-9EB8-4599-8810-D3B846B63903}" type="datetime1">
               <a:rPr lang="en-US" smtClean="0"/>
-              <a:t>6/3/2019</a:t>
+              <a:t>6/6/2019</a:t>
             </a:fld>
             <a:endParaRPr lang="en-US" dirty="0"/>
           </a:p>
@@ -3652,7 +3652,7 @@
           <a:p>
             <a:fld id="{D8BCF06E-CD1B-4301-991F-BAB9ABF46E5D}" type="datetime1">
               <a:rPr lang="en-US" smtClean="0"/>
-              <a:t>6/3/2019</a:t>
+              <a:t>6/6/2019</a:t>
             </a:fld>
             <a:endParaRPr lang="en-US" dirty="0"/>
           </a:p>
@@ -3983,7 +3983,7 @@
           <a:p>
             <a:fld id="{A73840E3-E52F-4B1B-9B7D-4BF87E01C946}" type="datetime1">
               <a:rPr lang="en-US" smtClean="0"/>
-              <a:t>6/3/2019</a:t>
+              <a:t>6/6/2019</a:t>
             </a:fld>
             <a:endParaRPr lang="en-US" dirty="0"/>
           </a:p>
@@ -4448,7 +4448,7 @@
           <a:p>
             <a:fld id="{C7552044-AFDA-4274-A4D6-399EA0B91BF2}" type="datetime1">
               <a:rPr lang="en-US" smtClean="0"/>
-              <a:t>6/3/2019</a:t>
+              <a:t>6/6/2019</a:t>
             </a:fld>
             <a:endParaRPr lang="en-US" dirty="0"/>
           </a:p>
@@ -4661,7 +4661,7 @@
           <a:p>
             <a:fld id="{617D184C-73BF-4B2E-AE72-88BE9A487F2E}" type="datetime1">
               <a:rPr lang="en-US" smtClean="0"/>
-              <a:t>6/3/2019</a:t>
+              <a:t>6/6/2019</a:t>
             </a:fld>
             <a:endParaRPr lang="en-US" dirty="0"/>
           </a:p>
@@ -4846,7 +4846,7 @@
           <a:p>
             <a:fld id="{7FB45EC1-6E0E-4103-B6A0-D379B42A0FB4}" type="datetime1">
               <a:rPr lang="en-US" smtClean="0"/>
-              <a:t>6/3/2019</a:t>
+              <a:t>6/6/2019</a:t>
             </a:fld>
             <a:endParaRPr lang="en-US" dirty="0"/>
           </a:p>
@@ -5187,7 +5187,7 @@
           <a:p>
             <a:fld id="{5A18D344-F9A9-4A77-B454-7250E224E1C7}" type="datetime1">
               <a:rPr lang="en-US" smtClean="0"/>
-              <a:t>6/3/2019</a:t>
+              <a:t>6/6/2019</a:t>
             </a:fld>
             <a:endParaRPr lang="en-US" dirty="0"/>
           </a:p>
@@ -5540,7 +5540,7 @@
           <a:p>
             <a:fld id="{263A00BB-C2EB-492F-8A60-A3A5E51FD0AB}" type="datetime1">
               <a:rPr lang="en-US" smtClean="0"/>
-              <a:t>6/3/2019</a:t>
+              <a:t>6/6/2019</a:t>
             </a:fld>
             <a:endParaRPr lang="en-US" dirty="0"/>
           </a:p>
@@ -7665,7 +7665,7 @@
           <a:p>
             <a:fld id="{BD48F75B-F450-4598-9E5A-C3C594F17E8F}" type="datetime1">
               <a:rPr lang="en-US" smtClean="0"/>
-              <a:t>6/3/2019</a:t>
+              <a:t>6/6/2019</a:t>
             </a:fld>
             <a:endParaRPr lang="en-US" dirty="0"/>
           </a:p>
@@ -10748,7 +10748,7 @@
         <p:spPr>
           <a:xfrm>
             <a:off x="2818356" y="1603332"/>
-            <a:ext cx="11267828" cy="5078313"/>
+            <a:ext cx="9629559" cy="5078313"/>
           </a:xfrm>
           <a:prstGeom prst="rect">
             <a:avLst/>
@@ -10781,7 +10781,7 @@
               <a:rPr lang="en-IN" sz="3600" dirty="0">
                 <a:cs typeface="Times New Roman" panose="02020603050405020304" pitchFamily="18" charset="0"/>
               </a:rPr>
-              <a:t>Daily, weekly, monthly and yearly report can be</a:t>
+              <a:t>Daily, weekly, monthly and yearly report </a:t>
             </a:r>
           </a:p>
           <a:p>
@@ -10789,7 +10789,7 @@
               <a:rPr lang="en-IN" sz="3600" dirty="0">
                 <a:cs typeface="Times New Roman" panose="02020603050405020304" pitchFamily="18" charset="0"/>
               </a:rPr>
-              <a:t>   generated</a:t>
+              <a:t>   can be generated</a:t>
             </a:r>
           </a:p>
           <a:p>
@@ -12698,17 +12698,8 @@
               <a:rPr lang="en-IN" sz="2400" dirty="0">
                 <a:cs typeface="Times New Roman" panose="02020603050405020304" pitchFamily="18" charset="0"/>
               </a:rPr>
-              <a:t>	- Artificial </a:t>
-            </a:r>
-            <a:r>
-              <a:rPr lang="en-IN" sz="2400" dirty="0" err="1">
-                <a:cs typeface="Times New Roman" panose="02020603050405020304" pitchFamily="18" charset="0"/>
-              </a:rPr>
-              <a:t>Intellegence</a:t>
-            </a:r>
-            <a:endParaRPr lang="en-IN" sz="2400" dirty="0">
-              <a:cs typeface="Times New Roman" panose="02020603050405020304" pitchFamily="18" charset="0"/>
-            </a:endParaRPr>
+              <a:t>	- Artificial Intelligence</a:t>
+            </a:r>
           </a:p>
           <a:p>
             <a:pPr lvl="0"/>

</xml_diff>